<commit_message>
Update D1 visual aid PDF and PPTX
Co-Authored-By: Claude Opus 4.6 <noreply@anthropic.com>
</commit_message>
<xml_diff>
--- a/D1-AIP-Threads/D1-visual-aid.pptx
+++ b/D1-AIP-Threads/D1-visual-aid.pptx
@@ -1284,7 +1284,7 @@
                 <a:ea typeface="Calibri" pitchFamily="34" charset="-122"/>
                 <a:cs typeface="Calibri" pitchFamily="34" charset="-120"/>
               </a:rPr>
-              <a:t>PALANTIR 实操教程  |  HANDS-ON TUTORIAL</a:t>
+              <a:t>PALANTIR HANDS-ON TUTORIAL</a:t>
             </a:r>
             <a:endParaRPr lang="en-US" sz="1200" dirty="0"/>
           </a:p>
@@ -1323,7 +1323,7 @@
                 <a:ea typeface="Trebuchet MS" pitchFamily="34" charset="-122"/>
                 <a:cs typeface="Trebuchet MS" pitchFamily="34" charset="-120"/>
               </a:rPr>
-              <a:t>D1: AIP Threads 基础</a:t>
+              <a:t>D1: AIP Threads Basics</a:t>
             </a:r>
             <a:endParaRPr lang="en-US" sz="3600" dirty="0"/>
           </a:p>
@@ -1362,7 +1362,7 @@
                 <a:ea typeface="Calibri" pitchFamily="34" charset="-122"/>
                 <a:cs typeface="Calibri" pitchFamily="34" charset="-120"/>
               </a:rPr>
-              <a:t>Drag a File, Ask AI — 3 Minutes</a:t>
+              <a:t>Drag a File, Ask AI</a:t>
             </a:r>
             <a:endParaRPr lang="en-US" sz="2000" dirty="0"/>
           </a:p>
@@ -1478,67 +1478,6 @@
                 <a:cs typeface="Calibri" pitchFamily="34" charset="-120"/>
               </a:rPr>
               <a:t>Demo Data: work_orders.csv (50 rows)</a:t>
-            </a:r>
-            <a:endParaRPr lang="en-US" sz="1300" dirty="0"/>
-          </a:p>
-        </p:txBody>
-      </p:sp>
-      <p:sp>
-        <p:nvSpPr>
-          <p:cNvPr id="9" name="Shape 7"/>
-          <p:cNvSpPr/>
-          <p:nvPr/>
-        </p:nvSpPr>
-        <p:spPr>
-          <a:xfrm>
-            <a:off x="731520" y="4206240"/>
-            <a:ext cx="1280160" cy="365760"/>
-          </a:xfrm>
-          <a:prstGeom prst="roundRect">
-            <a:avLst>
-              <a:gd name="adj" fmla="val 12500"/>
-            </a:avLst>
-          </a:prstGeom>
-          <a:solidFill>
-            <a:srgbClr val="2F81F7"/>
-          </a:solidFill>
-          <a:ln/>
-        </p:spPr>
-      </p:sp>
-      <p:sp>
-        <p:nvSpPr>
-          <p:cNvPr id="10" name="Text 8"/>
-          <p:cNvSpPr/>
-          <p:nvPr/>
-        </p:nvSpPr>
-        <p:spPr>
-          <a:xfrm>
-            <a:off x="731520" y="4206240"/>
-            <a:ext cx="1280160" cy="365760"/>
-          </a:xfrm>
-          <a:prstGeom prst="rect">
-            <a:avLst/>
-          </a:prstGeom>
-          <a:noFill/>
-          <a:ln/>
-        </p:spPr>
-        <p:txBody>
-          <a:bodyPr wrap="square" rtlCol="0" anchor="ctr"/>
-          <a:lstStyle/>
-          <a:p>
-            <a:pPr algn="ctr" indent="0" marL="0">
-              <a:buNone/>
-            </a:pPr>
-            <a:r>
-              <a:rPr lang="en-US" sz="1300" b="1" dirty="0">
-                <a:solidFill>
-                  <a:srgbClr val="FFFFFF"/>
-                </a:solidFill>
-                <a:latin typeface="Calibri" pitchFamily="34" charset="0"/>
-                <a:ea typeface="Calibri" pitchFamily="34" charset="-122"/>
-                <a:cs typeface="Calibri" pitchFamily="34" charset="-120"/>
-              </a:rPr>
-              <a:t>~3 min</a:t>
             </a:r>
             <a:endParaRPr lang="en-US" sz="1300" dirty="0"/>
           </a:p>
@@ -1668,7 +1607,7 @@
                 <a:ea typeface="Trebuchet MS" pitchFamily="34" charset="-122"/>
                 <a:cs typeface="Trebuchet MS" pitchFamily="34" charset="-120"/>
               </a:rPr>
-              <a:t>打开 AIP Threads  /  Open AIP Threads</a:t>
+              <a:t>Open AIP Threads</a:t>
             </a:r>
             <a:endParaRPr lang="en-US" sz="2200" dirty="0"/>
           </a:p>
@@ -1739,7 +1678,7 @@
                 <a:ea typeface="Calibri" pitchFamily="34" charset="-122"/>
                 <a:cs typeface="Calibri" pitchFamily="34" charset="-120"/>
               </a:rPr>
-              <a:t>📸 截图占位</a:t>
+              <a:t>Screenshot Placeholder</a:t>
             </a:r>
             <a:endParaRPr lang="en-US" sz="1400" dirty="0"/>
           </a:p>
@@ -1756,7 +1695,7 @@
                 <a:ea typeface="Calibri" pitchFamily="34" charset="-122"/>
                 <a:cs typeface="Calibri" pitchFamily="34" charset="-120"/>
               </a:rPr>
-              <a:t>Foundry 左侧导航栏</a:t>
+              <a:t>Foundry left sidebar</a:t>
             </a:r>
             <a:endParaRPr lang="en-US" sz="1400" dirty="0"/>
           </a:p>
@@ -1773,7 +1712,7 @@
                 <a:ea typeface="Calibri" pitchFamily="34" charset="-122"/>
                 <a:cs typeface="Calibri" pitchFamily="34" charset="-120"/>
               </a:rPr>
-              <a:t>高亮 AIP Threads 入口</a:t>
+              <a:t>Highlight AIP Threads entry</a:t>
             </a:r>
             <a:endParaRPr lang="en-US" sz="1400" dirty="0"/>
           </a:p>
@@ -1839,7 +1778,7 @@
                 <a:ea typeface="Trebuchet MS" pitchFamily="34" charset="-122"/>
                 <a:cs typeface="Trebuchet MS" pitchFamily="34" charset="-120"/>
               </a:rPr>
-              <a:t>操作步骤 / Steps</a:t>
+              <a:t>Steps</a:t>
             </a:r>
             <a:endParaRPr lang="en-US" sz="1400" dirty="0"/>
           </a:p>
@@ -1870,7 +1809,7 @@
               <a:buNone/>
             </a:pPr>
             <a:r>
-              <a:rPr lang="en-US" sz="1300" dirty="0">
+              <a:rPr lang="en-US" sz="1400" dirty="0">
                 <a:solidFill>
                   <a:srgbClr val="C9D1D9"/>
                 </a:solidFill>
@@ -1878,39 +1817,22 @@
                 <a:ea typeface="Calibri" pitchFamily="34" charset="-122"/>
                 <a:cs typeface="Calibri" pitchFamily="34" charset="-120"/>
               </a:rPr>
-              <a:t>1. 登录 Foundry</a:t>
-            </a:r>
-            <a:endParaRPr lang="en-US" sz="1300" dirty="0"/>
-          </a:p>
-          <a:p>
-            <a:pPr indent="0" marL="0">
-              <a:buNone/>
-            </a:pPr>
-            <a:r>
-              <a:rPr lang="en-US" sz="1100" i="1" dirty="0">
-                <a:solidFill>
-                  <a:srgbClr val="8B949E"/>
-                </a:solidFill>
-                <a:latin typeface="Calibri" pitchFamily="34" charset="0"/>
-                <a:ea typeface="Calibri" pitchFamily="34" charset="-122"/>
-                <a:cs typeface="Calibri" pitchFamily="34" charset="-120"/>
-              </a:rPr>
-              <a:t>    Log into Foundry</a:t>
-            </a:r>
-            <a:endParaRPr lang="en-US" sz="1300" dirty="0"/>
-          </a:p>
-          <a:p>
-            <a:pPr indent="0" marL="0">
-              <a:buNone/>
-            </a:pPr>
-            <a:endParaRPr lang="en-US" sz="1300" dirty="0"/>
-          </a:p>
-          <a:p>
-            <a:pPr indent="0" marL="0">
-              <a:buNone/>
-            </a:pPr>
-            <a:r>
-              <a:rPr lang="en-US" sz="1300" dirty="0">
+              <a:t>1. Log into Foundry</a:t>
+            </a:r>
+            <a:endParaRPr lang="en-US" sz="1400" dirty="0"/>
+          </a:p>
+          <a:p>
+            <a:pPr indent="0" marL="0">
+              <a:buNone/>
+            </a:pPr>
+            <a:endParaRPr lang="en-US" sz="1400" dirty="0"/>
+          </a:p>
+          <a:p>
+            <a:pPr indent="0" marL="0">
+              <a:buNone/>
+            </a:pPr>
+            <a:r>
+              <a:rPr lang="en-US" sz="1400" dirty="0">
                 <a:solidFill>
                   <a:srgbClr val="C9D1D9"/>
                 </a:solidFill>
@@ -1918,39 +1840,22 @@
                 <a:ea typeface="Calibri" pitchFamily="34" charset="-122"/>
                 <a:cs typeface="Calibri" pitchFamily="34" charset="-120"/>
               </a:rPr>
-              <a:t>2. 左侧栏 → AIP Threads</a:t>
-            </a:r>
-            <a:endParaRPr lang="en-US" sz="1300" dirty="0"/>
-          </a:p>
-          <a:p>
-            <a:pPr indent="0" marL="0">
-              <a:buNone/>
-            </a:pPr>
-            <a:r>
-              <a:rPr lang="en-US" sz="1100" i="1" dirty="0">
-                <a:solidFill>
-                  <a:srgbClr val="8B949E"/>
-                </a:solidFill>
-                <a:latin typeface="Calibri" pitchFamily="34" charset="0"/>
-                <a:ea typeface="Calibri" pitchFamily="34" charset="-122"/>
-                <a:cs typeface="Calibri" pitchFamily="34" charset="-120"/>
-              </a:rPr>
-              <a:t>    Sidebar → AIP Threads</a:t>
-            </a:r>
-            <a:endParaRPr lang="en-US" sz="1300" dirty="0"/>
-          </a:p>
-          <a:p>
-            <a:pPr indent="0" marL="0">
-              <a:buNone/>
-            </a:pPr>
-            <a:endParaRPr lang="en-US" sz="1300" dirty="0"/>
-          </a:p>
-          <a:p>
-            <a:pPr indent="0" marL="0">
-              <a:buNone/>
-            </a:pPr>
-            <a:r>
-              <a:rPr lang="en-US" sz="1300" dirty="0">
+              <a:t>2. Sidebar → AIP Threads</a:t>
+            </a:r>
+            <a:endParaRPr lang="en-US" sz="1400" dirty="0"/>
+          </a:p>
+          <a:p>
+            <a:pPr indent="0" marL="0">
+              <a:buNone/>
+            </a:pPr>
+            <a:endParaRPr lang="en-US" sz="1400" dirty="0"/>
+          </a:p>
+          <a:p>
+            <a:pPr indent="0" marL="0">
+              <a:buNone/>
+            </a:pPr>
+            <a:r>
+              <a:rPr lang="en-US" sz="1400" dirty="0">
                 <a:solidFill>
                   <a:srgbClr val="C9D1D9"/>
                 </a:solidFill>
@@ -1958,26 +1863,9 @@
                 <a:ea typeface="Calibri" pitchFamily="34" charset="-122"/>
                 <a:cs typeface="Calibri" pitchFamily="34" charset="-120"/>
               </a:rPr>
-              <a:t>3. 进入空白对话界面</a:t>
-            </a:r>
-            <a:endParaRPr lang="en-US" sz="1300" dirty="0"/>
-          </a:p>
-          <a:p>
-            <a:pPr indent="0" marL="0">
-              <a:buNone/>
-            </a:pPr>
-            <a:r>
-              <a:rPr lang="en-US" sz="1100" i="1" dirty="0">
-                <a:solidFill>
-                  <a:srgbClr val="8B949E"/>
-                </a:solidFill>
-                <a:latin typeface="Calibri" pitchFamily="34" charset="0"/>
-                <a:ea typeface="Calibri" pitchFamily="34" charset="-122"/>
-                <a:cs typeface="Calibri" pitchFamily="34" charset="-120"/>
-              </a:rPr>
-              <a:t>    Enter blank chat interface</a:t>
-            </a:r>
-            <a:endParaRPr lang="en-US" sz="1300" dirty="0"/>
+              <a:t>3. Enter blank chat interface</a:t>
+            </a:r>
+            <a:endParaRPr lang="en-US" sz="1400" dirty="0"/>
           </a:p>
         </p:txBody>
       </p:sp>
@@ -2105,7 +1993,7 @@
                 <a:ea typeface="Trebuchet MS" pitchFamily="34" charset="-122"/>
                 <a:cs typeface="Trebuchet MS" pitchFamily="34" charset="-120"/>
               </a:rPr>
-              <a:t>上传数据文件  /  Upload Data File</a:t>
+              <a:t>Upload Data File</a:t>
             </a:r>
             <a:endParaRPr lang="en-US" sz="2200" dirty="0"/>
           </a:p>
@@ -2176,7 +2064,7 @@
                 <a:ea typeface="Calibri" pitchFamily="34" charset="-122"/>
                 <a:cs typeface="Calibri" pitchFamily="34" charset="-120"/>
               </a:rPr>
-              <a:t>📸 截图占位</a:t>
+              <a:t>Screenshot Placeholder</a:t>
             </a:r>
             <a:endParaRPr lang="en-US" sz="1400" dirty="0"/>
           </a:p>
@@ -2193,7 +2081,7 @@
                 <a:ea typeface="Calibri" pitchFamily="34" charset="-122"/>
                 <a:cs typeface="Calibri" pitchFamily="34" charset="-120"/>
               </a:rPr>
-              <a:t>将 work_orders.csv</a:t>
+              <a:t>Drag work_orders.csv</a:t>
             </a:r>
             <a:endParaRPr lang="en-US" sz="1400" dirty="0"/>
           </a:p>
@@ -2210,7 +2098,7 @@
                 <a:ea typeface="Calibri" pitchFamily="34" charset="-122"/>
                 <a:cs typeface="Calibri" pitchFamily="34" charset="-120"/>
               </a:rPr>
-              <a:t>拖入 Threads 输入框</a:t>
+              <a:t>into Threads input box</a:t>
             </a:r>
             <a:endParaRPr lang="en-US" sz="1400" dirty="0"/>
           </a:p>
@@ -2276,7 +2164,7 @@
                 <a:ea typeface="Trebuchet MS" pitchFamily="34" charset="-122"/>
                 <a:cs typeface="Trebuchet MS" pitchFamily="34" charset="-120"/>
               </a:rPr>
-              <a:t>数据概览 / Data Overview</a:t>
+              <a:t>Data Overview</a:t>
             </a:r>
             <a:endParaRPr lang="en-US" sz="1400" dirty="0"/>
           </a:p>
@@ -2377,7 +2265,7 @@
                 <a:ea typeface="Calibri" pitchFamily="34" charset="-122"/>
                 <a:cs typeface="Calibri" pitchFamily="34" charset="-120"/>
               </a:rPr>
-              <a:t>字段 / Fields:</a:t>
+              <a:t>Fields:</a:t>
             </a:r>
             <a:endParaRPr lang="en-US" sz="1200" dirty="0"/>
           </a:p>
@@ -2649,7 +2537,7 @@
                 <a:ea typeface="Trebuchet MS" pitchFamily="34" charset="-122"/>
                 <a:cs typeface="Trebuchet MS" pitchFamily="34" charset="-120"/>
               </a:rPr>
-              <a:t>提问 &amp; 追问  /  Ask &amp; Follow Up</a:t>
+              <a:t>Ask &amp; Follow Up</a:t>
             </a:r>
             <a:endParaRPr lang="en-US" sz="2200" dirty="0"/>
           </a:p>
@@ -2754,7 +2642,7 @@
                 <a:ea typeface="Calibri" pitchFamily="34" charset="-122"/>
                 <a:cs typeface="Calibri" pitchFamily="34" charset="-120"/>
               </a:rPr>
-              <a:t>哪个类别工单最多？</a:t>
+              <a:t>Which category has the most?</a:t>
             </a:r>
             <a:endParaRPr lang="en-US" sz="1300" dirty="0"/>
           </a:p>
@@ -2762,8 +2650,14 @@
             <a:pPr indent="0" marL="0">
               <a:buNone/>
             </a:pPr>
-            <a:r>
-              <a:rPr lang="en-US" sz="1100" i="1" dirty="0">
+            <a:endParaRPr lang="en-US" sz="1300" dirty="0"/>
+          </a:p>
+          <a:p>
+            <a:pPr indent="0" marL="0">
+              <a:buNone/>
+            </a:pPr>
+            <a:r>
+              <a:rPr lang="en-US" sz="1100" dirty="0">
                 <a:solidFill>
                   <a:srgbClr val="8B949E"/>
                 </a:solidFill>
@@ -2771,7 +2665,7 @@
                 <a:ea typeface="Calibri" pitchFamily="34" charset="-122"/>
                 <a:cs typeface="Calibri" pitchFamily="34" charset="-120"/>
               </a:rPr>
-              <a:t>Which category has the most?</a:t>
+              <a:t>Screenshot: AI response +</a:t>
             </a:r>
             <a:endParaRPr lang="en-US" sz="1300" dirty="0"/>
           </a:p>
@@ -2779,12 +2673,6 @@
             <a:pPr indent="0" marL="0">
               <a:buNone/>
             </a:pPr>
-            <a:endParaRPr lang="en-US" sz="1300" dirty="0"/>
-          </a:p>
-          <a:p>
-            <a:pPr indent="0" marL="0">
-              <a:buNone/>
-            </a:pPr>
             <a:r>
               <a:rPr lang="en-US" sz="1100" dirty="0">
                 <a:solidFill>
@@ -2794,24 +2682,7 @@
                 <a:ea typeface="Calibri" pitchFamily="34" charset="-122"/>
                 <a:cs typeface="Calibri" pitchFamily="34" charset="-120"/>
               </a:rPr>
-              <a:t>📸 截图：AI回复 + 统计结果</a:t>
-            </a:r>
-            <a:endParaRPr lang="en-US" sz="1300" dirty="0"/>
-          </a:p>
-          <a:p>
-            <a:pPr indent="0" marL="0">
-              <a:buNone/>
-            </a:pPr>
-            <a:r>
-              <a:rPr lang="en-US" sz="1000" i="1" dirty="0">
-                <a:solidFill>
-                  <a:srgbClr val="8B949E"/>
-                </a:solidFill>
-                <a:latin typeface="Calibri" pitchFamily="34" charset="0"/>
-                <a:ea typeface="Calibri" pitchFamily="34" charset="-122"/>
-                <a:cs typeface="Calibri" pitchFamily="34" charset="-120"/>
-              </a:rPr>
-              <a:t>    Screenshot: AI response</a:t>
+              <a:t>category breakdown</a:t>
             </a:r>
             <a:endParaRPr lang="en-US" sz="1300" dirty="0"/>
           </a:p>
@@ -2916,7 +2787,7 @@
                 <a:ea typeface="Calibri" pitchFamily="34" charset="-122"/>
                 <a:cs typeface="Calibri" pitchFamily="34" charset="-120"/>
               </a:rPr>
-              <a:t>Critical工单平均几天处理？</a:t>
+              <a:t>Avg days to resolve Critical?</a:t>
             </a:r>
             <a:endParaRPr lang="en-US" sz="1300" dirty="0"/>
           </a:p>
@@ -2924,8 +2795,14 @@
             <a:pPr indent="0" marL="0">
               <a:buNone/>
             </a:pPr>
-            <a:r>
-              <a:rPr lang="en-US" sz="1100" i="1" dirty="0">
+            <a:endParaRPr lang="en-US" sz="1300" dirty="0"/>
+          </a:p>
+          <a:p>
+            <a:pPr indent="0" marL="0">
+              <a:buNone/>
+            </a:pPr>
+            <a:r>
+              <a:rPr lang="en-US" sz="1100" dirty="0">
                 <a:solidFill>
                   <a:srgbClr val="8B949E"/>
                 </a:solidFill>
@@ -2933,7 +2810,7 @@
                 <a:ea typeface="Calibri" pitchFamily="34" charset="-122"/>
                 <a:cs typeface="Calibri" pitchFamily="34" charset="-120"/>
               </a:rPr>
-              <a:t>Avg days to resolve Critical?</a:t>
+              <a:t>Screenshot: AI calculation +</a:t>
             </a:r>
             <a:endParaRPr lang="en-US" sz="1300" dirty="0"/>
           </a:p>
@@ -2941,12 +2818,6 @@
             <a:pPr indent="0" marL="0">
               <a:buNone/>
             </a:pPr>
-            <a:endParaRPr lang="en-US" sz="1300" dirty="0"/>
-          </a:p>
-          <a:p>
-            <a:pPr indent="0" marL="0">
-              <a:buNone/>
-            </a:pPr>
             <a:r>
               <a:rPr lang="en-US" sz="1100" dirty="0">
                 <a:solidFill>
@@ -2956,24 +2827,7 @@
                 <a:ea typeface="Calibri" pitchFamily="34" charset="-122"/>
                 <a:cs typeface="Calibri" pitchFamily="34" charset="-120"/>
               </a:rPr>
-              <a:t>📸 截图：AI计算过程 + 结果</a:t>
-            </a:r>
-            <a:endParaRPr lang="en-US" sz="1300" dirty="0"/>
-          </a:p>
-          <a:p>
-            <a:pPr indent="0" marL="0">
-              <a:buNone/>
-            </a:pPr>
-            <a:r>
-              <a:rPr lang="en-US" sz="1000" i="1" dirty="0">
-                <a:solidFill>
-                  <a:srgbClr val="8B949E"/>
-                </a:solidFill>
-                <a:latin typeface="Calibri" pitchFamily="34" charset="0"/>
-                <a:ea typeface="Calibri" pitchFamily="34" charset="-122"/>
-                <a:cs typeface="Calibri" pitchFamily="34" charset="-120"/>
-              </a:rPr>
-              <a:t>    Screenshot: AI calculation</a:t>
+              <a:t>average result</a:t>
             </a:r>
             <a:endParaRPr lang="en-US" sz="1300" dirty="0"/>
           </a:p>
@@ -3078,7 +2932,7 @@
                 <a:ea typeface="Calibri" pitchFamily="34" charset="-122"/>
                 <a:cs typeface="Calibri" pitchFamily="34" charset="-120"/>
               </a:rPr>
-              <a:t>按月统计工单数量和总费用</a:t>
+              <a:t>Monthly summary of count &amp; total cost</a:t>
             </a:r>
             <a:endParaRPr lang="en-US" sz="1300" dirty="0"/>
           </a:p>
@@ -3086,8 +2940,14 @@
             <a:pPr indent="0" marL="0">
               <a:buNone/>
             </a:pPr>
-            <a:r>
-              <a:rPr lang="en-US" sz="1100" i="1" dirty="0">
+            <a:endParaRPr lang="en-US" sz="1300" dirty="0"/>
+          </a:p>
+          <a:p>
+            <a:pPr indent="0" marL="0">
+              <a:buNone/>
+            </a:pPr>
+            <a:r>
+              <a:rPr lang="en-US" sz="1100" dirty="0">
                 <a:solidFill>
                   <a:srgbClr val="8B949E"/>
                 </a:solidFill>
@@ -3095,47 +2955,7 @@
                 <a:ea typeface="Calibri" pitchFamily="34" charset="-122"/>
                 <a:cs typeface="Calibri" pitchFamily="34" charset="-120"/>
               </a:rPr>
-              <a:t>Monthly summary of count &amp; total cost</a:t>
-            </a:r>
-            <a:endParaRPr lang="en-US" sz="1300" dirty="0"/>
-          </a:p>
-          <a:p>
-            <a:pPr indent="0" marL="0">
-              <a:buNone/>
-            </a:pPr>
-            <a:endParaRPr lang="en-US" sz="1300" dirty="0"/>
-          </a:p>
-          <a:p>
-            <a:pPr indent="0" marL="0">
-              <a:buNone/>
-            </a:pPr>
-            <a:r>
-              <a:rPr lang="en-US" sz="1100" dirty="0">
-                <a:solidFill>
-                  <a:srgbClr val="8B949E"/>
-                </a:solidFill>
-                <a:latin typeface="Calibri" pitchFamily="34" charset="0"/>
-                <a:ea typeface="Calibri" pitchFamily="34" charset="-122"/>
-                <a:cs typeface="Calibri" pitchFamily="34" charset="-120"/>
-              </a:rPr>
-              <a:t>📸 截图：AI生成的表格式回复（期望看到按月分组的summary表）</a:t>
-            </a:r>
-            <a:endParaRPr lang="en-US" sz="1300" dirty="0"/>
-          </a:p>
-          <a:p>
-            <a:pPr indent="0" marL="0">
-              <a:buNone/>
-            </a:pPr>
-            <a:r>
-              <a:rPr lang="en-US" sz="1000" i="1" dirty="0">
-                <a:solidFill>
-                  <a:srgbClr val="8B949E"/>
-                </a:solidFill>
-                <a:latin typeface="Calibri" pitchFamily="34" charset="0"/>
-                <a:ea typeface="Calibri" pitchFamily="34" charset="-122"/>
-                <a:cs typeface="Calibri" pitchFamily="34" charset="-120"/>
-              </a:rPr>
-              <a:t>    Screenshot: AI-generated monthly table response</a:t>
+              <a:t>Screenshot: AI-generated monthly table response</a:t>
             </a:r>
             <a:endParaRPr lang="en-US" sz="1300" dirty="0"/>
           </a:p>
@@ -3245,7 +3065,7 @@
                 <a:ea typeface="Calibri" pitchFamily="34" charset="-122"/>
                 <a:cs typeface="Calibri" pitchFamily="34" charset="-120"/>
               </a:rPr>
-              <a:t>你学会了 / You learned:</a:t>
+              <a:t>You learned:</a:t>
             </a:r>
             <a:endParaRPr lang="en-US" sz="1800" dirty="0"/>
           </a:p>
@@ -3260,7 +3080,7 @@
               <a:buNone/>
             </a:pPr>
             <a:r>
-              <a:rPr lang="en-US" sz="1500" dirty="0">
+              <a:rPr lang="en-US" sz="1600" dirty="0">
                 <a:solidFill>
                   <a:srgbClr val="C9D1D9"/>
                 </a:solidFill>
@@ -3268,7 +3088,7 @@
                 <a:ea typeface="Calibri" pitchFamily="34" charset="-122"/>
                 <a:cs typeface="Calibri" pitchFamily="34" charset="-120"/>
               </a:rPr>
-              <a:t>✦  打开 AIP Threads</a:t>
+              <a:t>✦  Open AIP Threads in Foundry</a:t>
             </a:r>
             <a:endParaRPr lang="en-US" sz="1800" dirty="0"/>
           </a:p>
@@ -3276,31 +3096,37 @@
             <a:pPr indent="0" marL="0">
               <a:buNone/>
             </a:pPr>
-            <a:r>
-              <a:rPr lang="en-US" sz="1200" i="1" dirty="0">
-                <a:solidFill>
-                  <a:srgbClr val="8B949E"/>
-                </a:solidFill>
-                <a:latin typeface="Calibri" pitchFamily="34" charset="0"/>
-                <a:ea typeface="Calibri" pitchFamily="34" charset="-122"/>
-                <a:cs typeface="Calibri" pitchFamily="34" charset="-120"/>
-              </a:rPr>
-              <a:t>     Open AIP Threads</a:t>
-            </a:r>
             <a:endParaRPr lang="en-US" sz="1800" dirty="0"/>
           </a:p>
           <a:p>
             <a:pPr indent="0" marL="0">
               <a:buNone/>
             </a:pPr>
+            <a:r>
+              <a:rPr lang="en-US" sz="1600" dirty="0">
+                <a:solidFill>
+                  <a:srgbClr val="C9D1D9"/>
+                </a:solidFill>
+                <a:latin typeface="Calibri" pitchFamily="34" charset="0"/>
+                <a:ea typeface="Calibri" pitchFamily="34" charset="-122"/>
+                <a:cs typeface="Calibri" pitchFamily="34" charset="-120"/>
+              </a:rPr>
+              <a:t>✦  Drag in a file — AI recognizes the format</a:t>
+            </a:r>
             <a:endParaRPr lang="en-US" sz="1800" dirty="0"/>
           </a:p>
           <a:p>
             <a:pPr indent="0" marL="0">
               <a:buNone/>
             </a:pPr>
-            <a:r>
-              <a:rPr lang="en-US" sz="1500" dirty="0">
+            <a:endParaRPr lang="en-US" sz="1800" dirty="0"/>
+          </a:p>
+          <a:p>
+            <a:pPr indent="0" marL="0">
+              <a:buNone/>
+            </a:pPr>
+            <a:r>
+              <a:rPr lang="en-US" sz="1600" dirty="0">
                 <a:solidFill>
                   <a:srgbClr val="C9D1D9"/>
                 </a:solidFill>
@@ -3308,64 +3134,7 @@
                 <a:ea typeface="Calibri" pitchFamily="34" charset="-122"/>
                 <a:cs typeface="Calibri" pitchFamily="34" charset="-120"/>
               </a:rPr>
-              <a:t>✦  拖入文件，AI 自动识别格式</a:t>
-            </a:r>
-            <a:endParaRPr lang="en-US" sz="1800" dirty="0"/>
-          </a:p>
-          <a:p>
-            <a:pPr indent="0" marL="0">
-              <a:buNone/>
-            </a:pPr>
-            <a:r>
-              <a:rPr lang="en-US" sz="1200" i="1" dirty="0">
-                <a:solidFill>
-                  <a:srgbClr val="8B949E"/>
-                </a:solidFill>
-                <a:latin typeface="Calibri" pitchFamily="34" charset="0"/>
-                <a:ea typeface="Calibri" pitchFamily="34" charset="-122"/>
-                <a:cs typeface="Calibri" pitchFamily="34" charset="-120"/>
-              </a:rPr>
-              <a:t>     Drag in a file, AI recognizes it</a:t>
-            </a:r>
-            <a:endParaRPr lang="en-US" sz="1800" dirty="0"/>
-          </a:p>
-          <a:p>
-            <a:pPr indent="0" marL="0">
-              <a:buNone/>
-            </a:pPr>
-            <a:endParaRPr lang="en-US" sz="1800" dirty="0"/>
-          </a:p>
-          <a:p>
-            <a:pPr indent="0" marL="0">
-              <a:buNone/>
-            </a:pPr>
-            <a:r>
-              <a:rPr lang="en-US" sz="1500" dirty="0">
-                <a:solidFill>
-                  <a:srgbClr val="C9D1D9"/>
-                </a:solidFill>
-                <a:latin typeface="Calibri" pitchFamily="34" charset="0"/>
-                <a:ea typeface="Calibri" pitchFamily="34" charset="-122"/>
-                <a:cs typeface="Calibri" pitchFamily="34" charset="-120"/>
-              </a:rPr>
-              <a:t>✦  用自然语言提问，得到数据分析结果</a:t>
-            </a:r>
-            <a:endParaRPr lang="en-US" sz="1800" dirty="0"/>
-          </a:p>
-          <a:p>
-            <a:pPr indent="0" marL="0">
-              <a:buNone/>
-            </a:pPr>
-            <a:r>
-              <a:rPr lang="en-US" sz="1200" i="1" dirty="0">
-                <a:solidFill>
-                  <a:srgbClr val="8B949E"/>
-                </a:solidFill>
-                <a:latin typeface="Calibri" pitchFamily="34" charset="0"/>
-                <a:ea typeface="Calibri" pitchFamily="34" charset="-122"/>
-                <a:cs typeface="Calibri" pitchFamily="34" charset="-120"/>
-              </a:rPr>
-              <a:t>     Ask in plain language, get analysis</a:t>
+              <a:t>✦  Ask questions in plain language, get analysis</a:t>
             </a:r>
             <a:endParaRPr lang="en-US" sz="1800" dirty="0"/>
           </a:p>
@@ -3424,7 +3193,7 @@
                 <a:ea typeface="Calibri" pitchFamily="34" charset="-122"/>
                 <a:cs typeface="Calibri" pitchFamily="34" charset="-120"/>
               </a:rPr>
-              <a:t>下一期 / Next:  </a:t>
+              <a:t>Next:  </a:t>
             </a:r>
             <a:pPr indent="0" marL="0">
               <a:buNone/>
@@ -3438,7 +3207,7 @@
                 <a:ea typeface="Calibri" pitchFamily="34" charset="-122"/>
                 <a:cs typeface="Calibri" pitchFamily="34" charset="-120"/>
               </a:rPr>
-              <a:t>B1 — 从零建一个 Ontology  /  Create an Ontology from Scratch</a:t>
+              <a:t>B1 — Create an Ontology from Scratch</a:t>
             </a:r>
             <a:endParaRPr lang="en-US" sz="1300" dirty="0"/>
           </a:p>

</xml_diff>